<commit_message>
New Neural Network Output changes. New PPT changes.
</commit_message>
<xml_diff>
--- a/Text Classification using GCN-10-13-2022.pptx
+++ b/Text Classification using GCN-10-13-2022.pptx
@@ -54,6 +54,13 @@
     <p:sldId id="300" r:id="rId48"/>
     <p:sldId id="301" r:id="rId49"/>
     <p:sldId id="302" r:id="rId50"/>
+    <p:sldId id="313" r:id="rId51"/>
+    <p:sldId id="306" r:id="rId52"/>
+    <p:sldId id="308" r:id="rId53"/>
+    <p:sldId id="309" r:id="rId54"/>
+    <p:sldId id="310" r:id="rId55"/>
+    <p:sldId id="311" r:id="rId56"/>
+    <p:sldId id="312" r:id="rId57"/>
   </p:sldIdLst>
   <p:sldSz cx="12192000" cy="6858000"/>
   <p:notesSz cx="6858000" cy="9144000"/>
@@ -6864,7 +6871,7 @@
           <a:p>
             <a:fld id="{403CB87E-4591-47A1-9046-CF63F17215EF}" type="datetime2">
               <a:rPr lang="en-US" smtClean="0"/>
-              <a:t>Thursday, October 20, 2022</a:t>
+              <a:t>Sunday, October 23, 2022</a:t>
             </a:fld>
             <a:endParaRPr lang="en-US" dirty="0"/>
           </a:p>
@@ -7086,7 +7093,7 @@
           <a:p>
             <a:fld id="{2FA17F0E-8070-4DFE-A821-9A699EDBAD7E}" type="datetime2">
               <a:rPr lang="en-US" smtClean="0"/>
-              <a:t>Thursday, October 20, 2022</a:t>
+              <a:t>Sunday, October 23, 2022</a:t>
             </a:fld>
             <a:endParaRPr lang="en-US"/>
           </a:p>
@@ -7298,7 +7305,7 @@
           <a:p>
             <a:fld id="{D88D34AE-C7BF-46E5-A968-01C6641F6476}" type="datetime2">
               <a:rPr lang="en-US" smtClean="0"/>
-              <a:t>Thursday, October 20, 2022</a:t>
+              <a:t>Sunday, October 23, 2022</a:t>
             </a:fld>
             <a:endParaRPr lang="en-US"/>
           </a:p>
@@ -7539,7 +7546,7 @@
           <a:p>
             <a:fld id="{F33DE70B-B772-416E-A790-995760B1742E}" type="datetime2">
               <a:rPr lang="en-US" smtClean="0"/>
-              <a:t>Thursday, October 20, 2022</a:t>
+              <a:t>Sunday, October 23, 2022</a:t>
             </a:fld>
             <a:endParaRPr lang="en-US" dirty="0"/>
           </a:p>
@@ -7838,7 +7845,7 @@
           <a:p>
             <a:fld id="{76760CDE-A6F1-4138-AF12-ED09E8E5FB6B}" type="datetime2">
               <a:rPr lang="en-US" smtClean="0"/>
-              <a:t>Thursday, October 20, 2022</a:t>
+              <a:t>Sunday, October 23, 2022</a:t>
             </a:fld>
             <a:endParaRPr lang="en-US"/>
           </a:p>
@@ -8170,7 +8177,7 @@
           <a:p>
             <a:fld id="{DB15F8B1-DB7B-4D28-A97D-40FB2DD1EF78}" type="datetime2">
               <a:rPr lang="en-US" smtClean="0"/>
-              <a:t>Thursday, October 20, 2022</a:t>
+              <a:t>Sunday, October 23, 2022</a:t>
             </a:fld>
             <a:endParaRPr lang="en-US"/>
           </a:p>
@@ -8616,7 +8623,7 @@
           <a:p>
             <a:fld id="{14039161-23B8-4738-9069-73EBE8884FDD}" type="datetime2">
               <a:rPr lang="en-US" smtClean="0"/>
-              <a:t>Thursday, October 20, 2022</a:t>
+              <a:t>Sunday, October 23, 2022</a:t>
             </a:fld>
             <a:endParaRPr lang="en-US"/>
           </a:p>
@@ -8772,7 +8779,7 @@
           <a:p>
             <a:fld id="{FA994D44-7693-499F-AC6C-11696134FE3F}" type="datetime2">
               <a:rPr lang="en-US" smtClean="0"/>
-              <a:t>Thursday, October 20, 2022</a:t>
+              <a:t>Sunday, October 23, 2022</a:t>
             </a:fld>
             <a:endParaRPr lang="en-US"/>
           </a:p>
@@ -8889,7 +8896,7 @@
           <a:p>
             <a:fld id="{363AF2AE-472C-4EF3-ABB2-24BAA9AE3CF7}" type="datetime2">
               <a:rPr lang="en-US" smtClean="0"/>
-              <a:t>Thursday, October 20, 2022</a:t>
+              <a:t>Sunday, October 23, 2022</a:t>
             </a:fld>
             <a:endParaRPr lang="en-US"/>
           </a:p>
@@ -9216,7 +9223,7 @@
           <a:p>
             <a:fld id="{EAEA162C-A7C1-4263-9453-1BAFF8C39559}" type="datetime2">
               <a:rPr lang="en-US" smtClean="0"/>
-              <a:t>Thursday, October 20, 2022</a:t>
+              <a:t>Sunday, October 23, 2022</a:t>
             </a:fld>
             <a:endParaRPr lang="en-US"/>
           </a:p>
@@ -9522,7 +9529,7 @@
           <a:p>
             <a:fld id="{64DF6793-3458-4587-8168-65F0C37A92D2}" type="datetime2">
               <a:rPr lang="en-US" smtClean="0"/>
-              <a:t>Thursday, October 20, 2022</a:t>
+              <a:t>Sunday, October 23, 2022</a:t>
             </a:fld>
             <a:endParaRPr lang="en-US"/>
           </a:p>
@@ -9875,7 +9882,7 @@
             <a:fld id="{E8352ED3-3C46-4C9A-9738-67B2D875E7E2}" type="datetime2">
               <a:rPr lang="en-US" smtClean="0"/>
               <a:pPr/>
-              <a:t>Thursday, October 20, 2022</a:t>
+              <a:t>Sunday, October 23, 2022</a:t>
             </a:fld>
             <a:endParaRPr lang="en-US" dirty="0"/>
           </a:p>
@@ -14773,7 +14780,7 @@
           <p:nvPr>
             <p:extLst>
               <p:ext uri="{D42A27DB-BD31-4B8C-83A1-F6EECF244321}">
-                <p14:modId xmlns:p14="http://schemas.microsoft.com/office/powerpoint/2010/main" val="398108421"/>
+                <p14:modId xmlns:p14="http://schemas.microsoft.com/office/powerpoint/2010/main" val="3167764479"/>
               </p:ext>
             </p:extLst>
           </p:nvPr>
@@ -17794,6 +17801,166 @@
                     <a:bodyPr/>
                     <a:lstStyle/>
                     <a:p>
+                      <a:pPr marL="0" marR="0" algn="just" defTabSz="914400" rtl="0" eaLnBrk="1" latinLnBrk="0" hangingPunct="1">
+                        <a:lnSpc>
+                          <a:spcPct val="107000"/>
+                        </a:lnSpc>
+                        <a:spcBef>
+                          <a:spcPts val="0"/>
+                        </a:spcBef>
+                        <a:spcAft>
+                          <a:spcPts val="0"/>
+                        </a:spcAft>
+                      </a:pPr>
+                      <a:r>
+                        <a:rPr lang="en-US" sz="1100" kern="1200" dirty="0">
+                          <a:solidFill>
+                            <a:schemeClr val="dk1"/>
+                          </a:solidFill>
+                          <a:effectLst/>
+                          <a:latin typeface="Calibri" panose="020F0502020204030204" pitchFamily="34" charset="0"/>
+                          <a:ea typeface="+mn-ea"/>
+                          <a:cs typeface="Calibri" panose="020F0502020204030204" pitchFamily="34" charset="0"/>
+                        </a:rPr>
+                        <a:t> 200</a:t>
+                      </a:r>
+                    </a:p>
+                  </a:txBody>
+                  <a:tcPr marL="68580" marR="68580" marT="0" marB="0"/>
+                </a:tc>
+                <a:tc>
+                  <a:txBody>
+                    <a:bodyPr/>
+                    <a:lstStyle/>
+                    <a:p>
+                      <a:pPr marL="0" marR="0" algn="just" defTabSz="914400" rtl="0" eaLnBrk="1" latinLnBrk="0" hangingPunct="1">
+                        <a:lnSpc>
+                          <a:spcPct val="107000"/>
+                        </a:lnSpc>
+                        <a:spcBef>
+                          <a:spcPts val="0"/>
+                        </a:spcBef>
+                        <a:spcAft>
+                          <a:spcPts val="0"/>
+                        </a:spcAft>
+                      </a:pPr>
+                      <a:r>
+                        <a:rPr lang="en-US" sz="1100" kern="1200" dirty="0">
+                          <a:solidFill>
+                            <a:schemeClr val="dk1"/>
+                          </a:solidFill>
+                          <a:effectLst/>
+                          <a:latin typeface="Calibri" panose="020F0502020204030204" pitchFamily="34" charset="0"/>
+                          <a:ea typeface="+mn-ea"/>
+                          <a:cs typeface="Calibri" panose="020F0502020204030204" pitchFamily="34" charset="0"/>
+                        </a:rPr>
+                        <a:t>0.849</a:t>
+                      </a:r>
+                    </a:p>
+                  </a:txBody>
+                  <a:tcPr marL="68580" marR="68580" marT="0" marB="0"/>
+                </a:tc>
+                <a:tc>
+                  <a:txBody>
+                    <a:bodyPr/>
+                    <a:lstStyle/>
+                    <a:p>
+                      <a:pPr marL="0" marR="0" algn="just" defTabSz="914400" rtl="0" eaLnBrk="1" latinLnBrk="0" hangingPunct="1">
+                        <a:lnSpc>
+                          <a:spcPct val="107000"/>
+                        </a:lnSpc>
+                        <a:spcBef>
+                          <a:spcPts val="0"/>
+                        </a:spcBef>
+                        <a:spcAft>
+                          <a:spcPts val="0"/>
+                        </a:spcAft>
+                      </a:pPr>
+                      <a:r>
+                        <a:rPr lang="en-US" sz="1100" kern="1200">
+                          <a:solidFill>
+                            <a:schemeClr val="dk1"/>
+                          </a:solidFill>
+                          <a:effectLst/>
+                          <a:latin typeface="Calibri" panose="020F0502020204030204" pitchFamily="34" charset="0"/>
+                          <a:ea typeface="+mn-ea"/>
+                          <a:cs typeface="Calibri" panose="020F0502020204030204" pitchFamily="34" charset="0"/>
+                        </a:rPr>
+                        <a:t>0.729</a:t>
+                      </a:r>
+                    </a:p>
+                  </a:txBody>
+                  <a:tcPr marL="68580" marR="68580" marT="0" marB="0"/>
+                </a:tc>
+                <a:tc>
+                  <a:txBody>
+                    <a:bodyPr/>
+                    <a:lstStyle/>
+                    <a:p>
+                      <a:pPr marL="0" marR="0" algn="just" defTabSz="914400" rtl="0" eaLnBrk="1" latinLnBrk="0" hangingPunct="1">
+                        <a:lnSpc>
+                          <a:spcPct val="107000"/>
+                        </a:lnSpc>
+                        <a:spcBef>
+                          <a:spcPts val="0"/>
+                        </a:spcBef>
+                        <a:spcAft>
+                          <a:spcPts val="0"/>
+                        </a:spcAft>
+                      </a:pPr>
+                      <a:r>
+                        <a:rPr lang="en-US" sz="1100" kern="1200" dirty="0">
+                          <a:solidFill>
+                            <a:schemeClr val="dk1"/>
+                          </a:solidFill>
+                          <a:effectLst/>
+                          <a:latin typeface="Calibri" panose="020F0502020204030204" pitchFamily="34" charset="0"/>
+                          <a:ea typeface="+mn-ea"/>
+                          <a:cs typeface="Calibri" panose="020F0502020204030204" pitchFamily="34" charset="0"/>
+                        </a:rPr>
+                        <a:t>0.888</a:t>
+                      </a:r>
+                    </a:p>
+                  </a:txBody>
+                  <a:tcPr marL="68580" marR="68580" marT="0" marB="0"/>
+                </a:tc>
+                <a:tc>
+                  <a:txBody>
+                    <a:bodyPr/>
+                    <a:lstStyle/>
+                    <a:p>
+                      <a:pPr marL="0" marR="0" algn="just" defTabSz="914400" rtl="0" eaLnBrk="1" latinLnBrk="0" hangingPunct="1">
+                        <a:lnSpc>
+                          <a:spcPct val="107000"/>
+                        </a:lnSpc>
+                        <a:spcBef>
+                          <a:spcPts val="0"/>
+                        </a:spcBef>
+                        <a:spcAft>
+                          <a:spcPts val="0"/>
+                        </a:spcAft>
+                      </a:pPr>
+                      <a:r>
+                        <a:rPr lang="en-US" sz="1100" kern="1200" dirty="0">
+                          <a:solidFill>
+                            <a:schemeClr val="dk1"/>
+                          </a:solidFill>
+                          <a:effectLst/>
+                          <a:latin typeface="Calibri" panose="020F0502020204030204" pitchFamily="34" charset="0"/>
+                          <a:ea typeface="+mn-ea"/>
+                          <a:cs typeface="Calibri" panose="020F0502020204030204" pitchFamily="34" charset="0"/>
+                        </a:rPr>
+                        <a:t>0.795</a:t>
+                      </a:r>
+                    </a:p>
+                  </a:txBody>
+                  <a:tcPr marL="68580" marR="68580" marT="0" marB="0"/>
+                </a:tc>
+                <a:tc>
+                  <a:txBody>
+                    <a:bodyPr/>
+                    <a:lstStyle/>
+                    <a:p>
                       <a:pPr marL="0" marR="0" algn="just">
                         <a:lnSpc>
                           <a:spcPct val="107000"/>
@@ -17809,146 +17976,11 @@
                         <a:rPr lang="en-US" sz="1100" dirty="0">
                           <a:effectLst/>
                           <a:latin typeface="Calibri" panose="020F0502020204030204" pitchFamily="34" charset="0"/>
+                          <a:ea typeface="Calibri" panose="020F0502020204030204" pitchFamily="34" charset="0"/>
                           <a:cs typeface="Calibri" panose="020F0502020204030204" pitchFamily="34" charset="0"/>
                         </a:rPr>
-                        <a:t> 200</a:t>
+                        <a:t>4.88 hrs.</a:t>
                       </a:r>
-                      <a:endParaRPr lang="en-US" sz="1100" dirty="0">
-                        <a:effectLst/>
-                        <a:latin typeface="Calibri" panose="020F0502020204030204" pitchFamily="34" charset="0"/>
-                        <a:ea typeface="Calibri" panose="020F0502020204030204" pitchFamily="34" charset="0"/>
-                        <a:cs typeface="Calibri" panose="020F0502020204030204" pitchFamily="34" charset="0"/>
-                      </a:endParaRPr>
-                    </a:p>
-                  </a:txBody>
-                  <a:tcPr marL="68580" marR="68580" marT="0" marB="0"/>
-                </a:tc>
-                <a:tc>
-                  <a:txBody>
-                    <a:bodyPr/>
-                    <a:lstStyle/>
-                    <a:p>
-                      <a:pPr marL="0" marR="0" algn="just">
-                        <a:lnSpc>
-                          <a:spcPct val="107000"/>
-                        </a:lnSpc>
-                        <a:spcBef>
-                          <a:spcPts val="0"/>
-                        </a:spcBef>
-                        <a:spcAft>
-                          <a:spcPts val="0"/>
-                        </a:spcAft>
-                      </a:pPr>
-                      <a:endParaRPr lang="en-US" sz="1100" dirty="0">
-                        <a:effectLst/>
-                        <a:latin typeface="Calibri" panose="020F0502020204030204" pitchFamily="34" charset="0"/>
-                        <a:ea typeface="Calibri" panose="020F0502020204030204" pitchFamily="34" charset="0"/>
-                        <a:cs typeface="Calibri" panose="020F0502020204030204" pitchFamily="34" charset="0"/>
-                      </a:endParaRPr>
-                    </a:p>
-                  </a:txBody>
-                  <a:tcPr marL="68580" marR="68580" marT="0" marB="0"/>
-                </a:tc>
-                <a:tc>
-                  <a:txBody>
-                    <a:bodyPr/>
-                    <a:lstStyle/>
-                    <a:p>
-                      <a:pPr marL="0" marR="0" algn="just">
-                        <a:lnSpc>
-                          <a:spcPct val="107000"/>
-                        </a:lnSpc>
-                        <a:spcBef>
-                          <a:spcPts val="0"/>
-                        </a:spcBef>
-                        <a:spcAft>
-                          <a:spcPts val="0"/>
-                        </a:spcAft>
-                      </a:pPr>
-                      <a:endParaRPr lang="en-US" sz="1100" dirty="0">
-                        <a:effectLst/>
-                        <a:latin typeface="Calibri" panose="020F0502020204030204" pitchFamily="34" charset="0"/>
-                        <a:ea typeface="Calibri" panose="020F0502020204030204" pitchFamily="34" charset="0"/>
-                        <a:cs typeface="Calibri" panose="020F0502020204030204" pitchFamily="34" charset="0"/>
-                      </a:endParaRPr>
-                    </a:p>
-                  </a:txBody>
-                  <a:tcPr marL="68580" marR="68580" marT="0" marB="0"/>
-                </a:tc>
-                <a:tc>
-                  <a:txBody>
-                    <a:bodyPr/>
-                    <a:lstStyle/>
-                    <a:p>
-                      <a:pPr marL="0" marR="0" algn="just">
-                        <a:lnSpc>
-                          <a:spcPct val="107000"/>
-                        </a:lnSpc>
-                        <a:spcBef>
-                          <a:spcPts val="0"/>
-                        </a:spcBef>
-                        <a:spcAft>
-                          <a:spcPts val="0"/>
-                        </a:spcAft>
-                      </a:pPr>
-                      <a:endParaRPr lang="en-US" sz="1100" dirty="0">
-                        <a:effectLst/>
-                        <a:latin typeface="Calibri" panose="020F0502020204030204" pitchFamily="34" charset="0"/>
-                        <a:ea typeface="Calibri" panose="020F0502020204030204" pitchFamily="34" charset="0"/>
-                        <a:cs typeface="Calibri" panose="020F0502020204030204" pitchFamily="34" charset="0"/>
-                      </a:endParaRPr>
-                    </a:p>
-                  </a:txBody>
-                  <a:tcPr marL="68580" marR="68580" marT="0" marB="0"/>
-                </a:tc>
-                <a:tc>
-                  <a:txBody>
-                    <a:bodyPr/>
-                    <a:lstStyle/>
-                    <a:p>
-                      <a:pPr marL="0" marR="0" algn="just">
-                        <a:lnSpc>
-                          <a:spcPct val="107000"/>
-                        </a:lnSpc>
-                        <a:spcBef>
-                          <a:spcPts val="0"/>
-                        </a:spcBef>
-                        <a:spcAft>
-                          <a:spcPts val="0"/>
-                        </a:spcAft>
-                      </a:pPr>
-                      <a:endParaRPr lang="en-US" sz="1100" dirty="0">
-                        <a:effectLst/>
-                        <a:latin typeface="Calibri" panose="020F0502020204030204" pitchFamily="34" charset="0"/>
-                        <a:ea typeface="Calibri" panose="020F0502020204030204" pitchFamily="34" charset="0"/>
-                        <a:cs typeface="Calibri" panose="020F0502020204030204" pitchFamily="34" charset="0"/>
-                      </a:endParaRPr>
-                    </a:p>
-                  </a:txBody>
-                  <a:tcPr marL="68580" marR="68580" marT="0" marB="0"/>
-                </a:tc>
-                <a:tc>
-                  <a:txBody>
-                    <a:bodyPr/>
-                    <a:lstStyle/>
-                    <a:p>
-                      <a:pPr marL="0" marR="0" algn="just">
-                        <a:lnSpc>
-                          <a:spcPct val="107000"/>
-                        </a:lnSpc>
-                        <a:spcBef>
-                          <a:spcPts val="0"/>
-                        </a:spcBef>
-                        <a:spcAft>
-                          <a:spcPts val="0"/>
-                        </a:spcAft>
-                      </a:pPr>
-                      <a:endParaRPr lang="en-US" sz="1100" dirty="0">
-                        <a:effectLst/>
-                        <a:latin typeface="Calibri" panose="020F0502020204030204" pitchFamily="34" charset="0"/>
-                        <a:ea typeface="Calibri" panose="020F0502020204030204" pitchFamily="34" charset="0"/>
-                        <a:cs typeface="Calibri" panose="020F0502020204030204" pitchFamily="34" charset="0"/>
-                      </a:endParaRPr>
                     </a:p>
                   </a:txBody>
                   <a:tcPr marL="68580" marR="68580" marT="0" marB="0"/>
@@ -18033,10 +18065,10 @@
       </p:sp>
       <p:pic>
         <p:nvPicPr>
-          <p:cNvPr id="6" name="Picture 5">
+          <p:cNvPr id="4" name="Picture 3">
             <a:extLst>
               <a:ext uri="{FF2B5EF4-FFF2-40B4-BE49-F238E27FC236}">
-                <a16:creationId xmlns:a16="http://schemas.microsoft.com/office/drawing/2014/main" id="{8386D658-0404-4EBA-96BA-9B4CEAAE4059}"/>
+                <a16:creationId xmlns:a16="http://schemas.microsoft.com/office/drawing/2014/main" id="{1811D541-104A-4F03-8D86-60368334F234}"/>
               </a:ext>
             </a:extLst>
           </p:cNvPr>
@@ -18059,8 +18091,8 @@
         </p:blipFill>
         <p:spPr>
           <a:xfrm>
-            <a:off x="0" y="369332"/>
-            <a:ext cx="12192000" cy="3251200"/>
+            <a:off x="1" y="576152"/>
+            <a:ext cx="5914238" cy="6281848"/>
           </a:xfrm>
           <a:prstGeom prst="rect">
             <a:avLst/>
@@ -18069,10 +18101,10 @@
       </p:pic>
       <p:pic>
         <p:nvPicPr>
-          <p:cNvPr id="8" name="Picture 7">
+          <p:cNvPr id="7" name="Picture 6">
             <a:extLst>
               <a:ext uri="{FF2B5EF4-FFF2-40B4-BE49-F238E27FC236}">
-                <a16:creationId xmlns:a16="http://schemas.microsoft.com/office/drawing/2014/main" id="{EFF64409-8653-4AAF-9DED-70F4D9BF3ECC}"/>
+                <a16:creationId xmlns:a16="http://schemas.microsoft.com/office/drawing/2014/main" id="{D139C42E-26DB-4FC2-88CB-8DA9D5A62318}"/>
               </a:ext>
             </a:extLst>
           </p:cNvPr>
@@ -18095,8 +18127,8 @@
         </p:blipFill>
         <p:spPr>
           <a:xfrm>
-            <a:off x="0" y="3606800"/>
-            <a:ext cx="12192000" cy="3251200"/>
+            <a:off x="6096001" y="576152"/>
+            <a:ext cx="6082856" cy="6281848"/>
           </a:xfrm>
           <a:prstGeom prst="rect">
             <a:avLst/>
@@ -18929,10 +18961,10 @@
       </p:sp>
       <p:pic>
         <p:nvPicPr>
-          <p:cNvPr id="4" name="Picture 3">
+          <p:cNvPr id="5" name="Picture 4">
             <a:extLst>
               <a:ext uri="{FF2B5EF4-FFF2-40B4-BE49-F238E27FC236}">
-                <a16:creationId xmlns:a16="http://schemas.microsoft.com/office/drawing/2014/main" id="{608A8EC2-B7A9-4569-8B65-5D39302A6247}"/>
+                <a16:creationId xmlns:a16="http://schemas.microsoft.com/office/drawing/2014/main" id="{F5154691-54FA-4355-8390-FB164C4FC924}"/>
               </a:ext>
             </a:extLst>
           </p:cNvPr>
@@ -18955,8 +18987,8 @@
         </p:blipFill>
         <p:spPr>
           <a:xfrm>
-            <a:off x="0" y="369332"/>
-            <a:ext cx="12192000" cy="3251200"/>
+            <a:off x="1" y="830510"/>
+            <a:ext cx="5960376" cy="5960376"/>
           </a:xfrm>
           <a:prstGeom prst="rect">
             <a:avLst/>
@@ -18965,10 +18997,10 @@
       </p:pic>
       <p:pic>
         <p:nvPicPr>
-          <p:cNvPr id="6" name="Picture 5">
+          <p:cNvPr id="8" name="Picture 7">
             <a:extLst>
               <a:ext uri="{FF2B5EF4-FFF2-40B4-BE49-F238E27FC236}">
-                <a16:creationId xmlns:a16="http://schemas.microsoft.com/office/drawing/2014/main" id="{DB84961D-1513-4358-8DEA-816B8123EFBE}"/>
+                <a16:creationId xmlns:a16="http://schemas.microsoft.com/office/drawing/2014/main" id="{C7D44D02-24B3-4D8F-9C76-FF7BB4667BB6}"/>
               </a:ext>
             </a:extLst>
           </p:cNvPr>
@@ -18991,8 +19023,8 @@
         </p:blipFill>
         <p:spPr>
           <a:xfrm>
-            <a:off x="0" y="3497977"/>
-            <a:ext cx="12192000" cy="3251200"/>
+            <a:off x="6160316" y="759202"/>
+            <a:ext cx="6031684" cy="6031684"/>
           </a:xfrm>
           <a:prstGeom prst="rect">
             <a:avLst/>
@@ -19679,6 +19711,78 @@
           </a:p>
         </p:txBody>
       </p:sp>
+      <p:pic>
+        <p:nvPicPr>
+          <p:cNvPr id="10" name="Picture 9">
+            <a:extLst>
+              <a:ext uri="{FF2B5EF4-FFF2-40B4-BE49-F238E27FC236}">
+                <a16:creationId xmlns:a16="http://schemas.microsoft.com/office/drawing/2014/main" id="{F318EF3F-1E4C-4466-8EF0-5F5FBE8C00AC}"/>
+              </a:ext>
+            </a:extLst>
+          </p:cNvPr>
+          <p:cNvPicPr>
+            <a:picLocks noChangeAspect="1"/>
+          </p:cNvPicPr>
+          <p:nvPr/>
+        </p:nvPicPr>
+        <p:blipFill>
+          <a:blip r:embed="rId2">
+            <a:extLst>
+              <a:ext uri="{28A0092B-C50C-407E-A947-70E740481C1C}">
+                <a14:useLocalDpi xmlns:a14="http://schemas.microsoft.com/office/drawing/2010/main" val="0"/>
+              </a:ext>
+            </a:extLst>
+          </a:blip>
+          <a:stretch>
+            <a:fillRect/>
+          </a:stretch>
+        </p:blipFill>
+        <p:spPr>
+          <a:xfrm>
+            <a:off x="0" y="762001"/>
+            <a:ext cx="6096000" cy="6096000"/>
+          </a:xfrm>
+          <a:prstGeom prst="rect">
+            <a:avLst/>
+          </a:prstGeom>
+        </p:spPr>
+      </p:pic>
+      <p:pic>
+        <p:nvPicPr>
+          <p:cNvPr id="12" name="Picture 11">
+            <a:extLst>
+              <a:ext uri="{FF2B5EF4-FFF2-40B4-BE49-F238E27FC236}">
+                <a16:creationId xmlns:a16="http://schemas.microsoft.com/office/drawing/2014/main" id="{0C6B8A6F-D3E8-495B-BA67-AD842D355914}"/>
+              </a:ext>
+            </a:extLst>
+          </p:cNvPr>
+          <p:cNvPicPr>
+            <a:picLocks noChangeAspect="1"/>
+          </p:cNvPicPr>
+          <p:nvPr/>
+        </p:nvPicPr>
+        <p:blipFill>
+          <a:blip r:embed="rId3">
+            <a:extLst>
+              <a:ext uri="{28A0092B-C50C-407E-A947-70E740481C1C}">
+                <a14:useLocalDpi xmlns:a14="http://schemas.microsoft.com/office/drawing/2010/main" val="0"/>
+              </a:ext>
+            </a:extLst>
+          </a:blip>
+          <a:stretch>
+            <a:fillRect/>
+          </a:stretch>
+        </p:blipFill>
+        <p:spPr>
+          <a:xfrm>
+            <a:off x="6151337" y="762001"/>
+            <a:ext cx="6020606" cy="6020606"/>
+          </a:xfrm>
+          <a:prstGeom prst="rect">
+            <a:avLst/>
+          </a:prstGeom>
+        </p:spPr>
+      </p:pic>
     </p:spTree>
     <p:extLst>
       <p:ext uri="{BB962C8B-B14F-4D97-AF65-F5344CB8AC3E}">
@@ -21288,6 +21392,753 @@
 </p:sld>
 </file>
 
+<file path=ppt/slides/slide50.xml><?xml version="1.0" encoding="utf-8"?>
+<p:sld xmlns:a="http://schemas.openxmlformats.org/drawingml/2006/main" xmlns:r="http://schemas.openxmlformats.org/officeDocument/2006/relationships" xmlns:p="http://schemas.openxmlformats.org/presentationml/2006/main">
+  <p:cSld>
+    <p:spTree>
+      <p:nvGrpSpPr>
+        <p:cNvPr id="1" name=""/>
+        <p:cNvGrpSpPr/>
+        <p:nvPr/>
+      </p:nvGrpSpPr>
+      <p:grpSpPr>
+        <a:xfrm>
+          <a:off x="0" y="0"/>
+          <a:ext cx="0" cy="0"/>
+          <a:chOff x="0" y="0"/>
+          <a:chExt cx="0" cy="0"/>
+        </a:xfrm>
+      </p:grpSpPr>
+      <p:pic>
+        <p:nvPicPr>
+          <p:cNvPr id="3" name="Picture 2">
+            <a:extLst>
+              <a:ext uri="{FF2B5EF4-FFF2-40B4-BE49-F238E27FC236}">
+                <a16:creationId xmlns:a16="http://schemas.microsoft.com/office/drawing/2014/main" id="{A2FFDC7D-DD83-4C83-8EF9-CE382493AF23}"/>
+              </a:ext>
+            </a:extLst>
+          </p:cNvPr>
+          <p:cNvPicPr>
+            <a:picLocks noChangeAspect="1"/>
+          </p:cNvPicPr>
+          <p:nvPr/>
+        </p:nvPicPr>
+        <p:blipFill>
+          <a:blip r:embed="rId2"/>
+          <a:stretch>
+            <a:fillRect/>
+          </a:stretch>
+        </p:blipFill>
+        <p:spPr>
+          <a:xfrm>
+            <a:off x="-67714" y="0"/>
+            <a:ext cx="6163714" cy="6858000"/>
+          </a:xfrm>
+          <a:prstGeom prst="rect">
+            <a:avLst/>
+          </a:prstGeom>
+        </p:spPr>
+      </p:pic>
+      <p:pic>
+        <p:nvPicPr>
+          <p:cNvPr id="5" name="Picture 4">
+            <a:extLst>
+              <a:ext uri="{FF2B5EF4-FFF2-40B4-BE49-F238E27FC236}">
+                <a16:creationId xmlns:a16="http://schemas.microsoft.com/office/drawing/2014/main" id="{35F66461-4B63-4A52-871D-32EA4DCEE916}"/>
+              </a:ext>
+            </a:extLst>
+          </p:cNvPr>
+          <p:cNvPicPr>
+            <a:picLocks noChangeAspect="1"/>
+          </p:cNvPicPr>
+          <p:nvPr/>
+        </p:nvPicPr>
+        <p:blipFill>
+          <a:blip r:embed="rId3"/>
+          <a:stretch>
+            <a:fillRect/>
+          </a:stretch>
+        </p:blipFill>
+        <p:spPr>
+          <a:xfrm>
+            <a:off x="6047111" y="0"/>
+            <a:ext cx="6144889" cy="6858000"/>
+          </a:xfrm>
+          <a:prstGeom prst="rect">
+            <a:avLst/>
+          </a:prstGeom>
+        </p:spPr>
+      </p:pic>
+    </p:spTree>
+    <p:extLst>
+      <p:ext uri="{BB962C8B-B14F-4D97-AF65-F5344CB8AC3E}">
+        <p14:creationId xmlns:p14="http://schemas.microsoft.com/office/powerpoint/2010/main" val="863833818"/>
+      </p:ext>
+    </p:extLst>
+  </p:cSld>
+  <p:clrMapOvr>
+    <a:masterClrMapping/>
+  </p:clrMapOvr>
+</p:sld>
+</file>
+
+<file path=ppt/slides/slide51.xml><?xml version="1.0" encoding="utf-8"?>
+<p:sld xmlns:a="http://schemas.openxmlformats.org/drawingml/2006/main" xmlns:r="http://schemas.openxmlformats.org/officeDocument/2006/relationships" xmlns:p="http://schemas.openxmlformats.org/presentationml/2006/main">
+  <p:cSld>
+    <p:spTree>
+      <p:nvGrpSpPr>
+        <p:cNvPr id="1" name=""/>
+        <p:cNvGrpSpPr/>
+        <p:nvPr/>
+      </p:nvGrpSpPr>
+      <p:grpSpPr>
+        <a:xfrm>
+          <a:off x="0" y="0"/>
+          <a:ext cx="0" cy="0"/>
+          <a:chOff x="0" y="0"/>
+          <a:chExt cx="0" cy="0"/>
+        </a:xfrm>
+      </p:grpSpPr>
+      <p:pic>
+        <p:nvPicPr>
+          <p:cNvPr id="3" name="Picture 2">
+            <a:extLst>
+              <a:ext uri="{FF2B5EF4-FFF2-40B4-BE49-F238E27FC236}">
+                <a16:creationId xmlns:a16="http://schemas.microsoft.com/office/drawing/2014/main" id="{17B29B38-4CE7-4638-94A9-16634520C18E}"/>
+              </a:ext>
+            </a:extLst>
+          </p:cNvPr>
+          <p:cNvPicPr>
+            <a:picLocks noChangeAspect="1"/>
+          </p:cNvPicPr>
+          <p:nvPr/>
+        </p:nvPicPr>
+        <p:blipFill>
+          <a:blip r:embed="rId2"/>
+          <a:stretch>
+            <a:fillRect/>
+          </a:stretch>
+        </p:blipFill>
+        <p:spPr>
+          <a:xfrm>
+            <a:off x="0" y="0"/>
+            <a:ext cx="12192000" cy="3196206"/>
+          </a:xfrm>
+          <a:prstGeom prst="rect">
+            <a:avLst/>
+          </a:prstGeom>
+        </p:spPr>
+      </p:pic>
+      <p:pic>
+        <p:nvPicPr>
+          <p:cNvPr id="6" name="Picture 5">
+            <a:extLst>
+              <a:ext uri="{FF2B5EF4-FFF2-40B4-BE49-F238E27FC236}">
+                <a16:creationId xmlns:a16="http://schemas.microsoft.com/office/drawing/2014/main" id="{AB033E59-191A-4AD0-BB71-0890210F6893}"/>
+              </a:ext>
+            </a:extLst>
+          </p:cNvPr>
+          <p:cNvPicPr>
+            <a:picLocks noChangeAspect="1"/>
+          </p:cNvPicPr>
+          <p:nvPr/>
+        </p:nvPicPr>
+        <p:blipFill>
+          <a:blip r:embed="rId3"/>
+          <a:stretch>
+            <a:fillRect/>
+          </a:stretch>
+        </p:blipFill>
+        <p:spPr>
+          <a:xfrm>
+            <a:off x="0" y="3196206"/>
+            <a:ext cx="12192000" cy="3661794"/>
+          </a:xfrm>
+          <a:prstGeom prst="rect">
+            <a:avLst/>
+          </a:prstGeom>
+        </p:spPr>
+      </p:pic>
+    </p:spTree>
+    <p:extLst>
+      <p:ext uri="{BB962C8B-B14F-4D97-AF65-F5344CB8AC3E}">
+        <p14:creationId xmlns:p14="http://schemas.microsoft.com/office/powerpoint/2010/main" val="1606246845"/>
+      </p:ext>
+    </p:extLst>
+  </p:cSld>
+  <p:clrMapOvr>
+    <a:masterClrMapping/>
+  </p:clrMapOvr>
+</p:sld>
+</file>
+
+<file path=ppt/slides/slide52.xml><?xml version="1.0" encoding="utf-8"?>
+<p:sld xmlns:a="http://schemas.openxmlformats.org/drawingml/2006/main" xmlns:r="http://schemas.openxmlformats.org/officeDocument/2006/relationships" xmlns:p="http://schemas.openxmlformats.org/presentationml/2006/main">
+  <p:cSld>
+    <p:spTree>
+      <p:nvGrpSpPr>
+        <p:cNvPr id="1" name=""/>
+        <p:cNvGrpSpPr/>
+        <p:nvPr/>
+      </p:nvGrpSpPr>
+      <p:grpSpPr>
+        <a:xfrm>
+          <a:off x="0" y="0"/>
+          <a:ext cx="0" cy="0"/>
+          <a:chOff x="0" y="0"/>
+          <a:chExt cx="0" cy="0"/>
+        </a:xfrm>
+      </p:grpSpPr>
+      <p:pic>
+        <p:nvPicPr>
+          <p:cNvPr id="3" name="Picture 2">
+            <a:extLst>
+              <a:ext uri="{FF2B5EF4-FFF2-40B4-BE49-F238E27FC236}">
+                <a16:creationId xmlns:a16="http://schemas.microsoft.com/office/drawing/2014/main" id="{08EB1C4A-733D-4395-949A-BF6DF5B3DF09}"/>
+              </a:ext>
+            </a:extLst>
+          </p:cNvPr>
+          <p:cNvPicPr>
+            <a:picLocks noChangeAspect="1"/>
+          </p:cNvPicPr>
+          <p:nvPr/>
+        </p:nvPicPr>
+        <p:blipFill>
+          <a:blip r:embed="rId2"/>
+          <a:stretch>
+            <a:fillRect/>
+          </a:stretch>
+        </p:blipFill>
+        <p:spPr>
+          <a:xfrm>
+            <a:off x="0" y="0"/>
+            <a:ext cx="12191999" cy="3242759"/>
+          </a:xfrm>
+          <a:prstGeom prst="rect">
+            <a:avLst/>
+          </a:prstGeom>
+        </p:spPr>
+      </p:pic>
+      <p:pic>
+        <p:nvPicPr>
+          <p:cNvPr id="4" name="Picture 3">
+            <a:extLst>
+              <a:ext uri="{FF2B5EF4-FFF2-40B4-BE49-F238E27FC236}">
+                <a16:creationId xmlns:a16="http://schemas.microsoft.com/office/drawing/2014/main" id="{628BD657-8384-43EA-A7E0-AD13E20CCBCD}"/>
+              </a:ext>
+            </a:extLst>
+          </p:cNvPr>
+          <p:cNvPicPr>
+            <a:picLocks noChangeAspect="1"/>
+          </p:cNvPicPr>
+          <p:nvPr/>
+        </p:nvPicPr>
+        <p:blipFill>
+          <a:blip r:embed="rId3"/>
+          <a:stretch>
+            <a:fillRect/>
+          </a:stretch>
+        </p:blipFill>
+        <p:spPr>
+          <a:xfrm>
+            <a:off x="0" y="3242759"/>
+            <a:ext cx="12192000" cy="3615241"/>
+          </a:xfrm>
+          <a:prstGeom prst="rect">
+            <a:avLst/>
+          </a:prstGeom>
+        </p:spPr>
+      </p:pic>
+    </p:spTree>
+    <p:extLst>
+      <p:ext uri="{BB962C8B-B14F-4D97-AF65-F5344CB8AC3E}">
+        <p14:creationId xmlns:p14="http://schemas.microsoft.com/office/powerpoint/2010/main" val="1393901264"/>
+      </p:ext>
+    </p:extLst>
+  </p:cSld>
+  <p:clrMapOvr>
+    <a:masterClrMapping/>
+  </p:clrMapOvr>
+</p:sld>
+</file>
+
+<file path=ppt/slides/slide53.xml><?xml version="1.0" encoding="utf-8"?>
+<p:sld xmlns:a="http://schemas.openxmlformats.org/drawingml/2006/main" xmlns:r="http://schemas.openxmlformats.org/officeDocument/2006/relationships" xmlns:p="http://schemas.openxmlformats.org/presentationml/2006/main">
+  <p:cSld>
+    <p:spTree>
+      <p:nvGrpSpPr>
+        <p:cNvPr id="1" name=""/>
+        <p:cNvGrpSpPr/>
+        <p:nvPr/>
+      </p:nvGrpSpPr>
+      <p:grpSpPr>
+        <a:xfrm>
+          <a:off x="0" y="0"/>
+          <a:ext cx="0" cy="0"/>
+          <a:chOff x="0" y="0"/>
+          <a:chExt cx="0" cy="0"/>
+        </a:xfrm>
+      </p:grpSpPr>
+      <p:pic>
+        <p:nvPicPr>
+          <p:cNvPr id="5" name="Picture 4">
+            <a:extLst>
+              <a:ext uri="{FF2B5EF4-FFF2-40B4-BE49-F238E27FC236}">
+                <a16:creationId xmlns:a16="http://schemas.microsoft.com/office/drawing/2014/main" id="{88731196-14BC-44B3-BBFE-4189C667452E}"/>
+              </a:ext>
+            </a:extLst>
+          </p:cNvPr>
+          <p:cNvPicPr>
+            <a:picLocks noChangeAspect="1"/>
+          </p:cNvPicPr>
+          <p:nvPr/>
+        </p:nvPicPr>
+        <p:blipFill>
+          <a:blip r:embed="rId2"/>
+          <a:stretch>
+            <a:fillRect/>
+          </a:stretch>
+        </p:blipFill>
+        <p:spPr>
+          <a:xfrm>
+            <a:off x="1" y="0"/>
+            <a:ext cx="12192000" cy="3209925"/>
+          </a:xfrm>
+          <a:prstGeom prst="rect">
+            <a:avLst/>
+          </a:prstGeom>
+        </p:spPr>
+      </p:pic>
+      <p:pic>
+        <p:nvPicPr>
+          <p:cNvPr id="7" name="Picture 6">
+            <a:extLst>
+              <a:ext uri="{FF2B5EF4-FFF2-40B4-BE49-F238E27FC236}">
+                <a16:creationId xmlns:a16="http://schemas.microsoft.com/office/drawing/2014/main" id="{3378DA60-1828-4DB6-9855-206994BBB74A}"/>
+              </a:ext>
+            </a:extLst>
+          </p:cNvPr>
+          <p:cNvPicPr>
+            <a:picLocks noChangeAspect="1"/>
+          </p:cNvPicPr>
+          <p:nvPr/>
+        </p:nvPicPr>
+        <p:blipFill>
+          <a:blip r:embed="rId3"/>
+          <a:stretch>
+            <a:fillRect/>
+          </a:stretch>
+        </p:blipFill>
+        <p:spPr>
+          <a:xfrm>
+            <a:off x="0" y="3209925"/>
+            <a:ext cx="12192000" cy="3648075"/>
+          </a:xfrm>
+          <a:prstGeom prst="rect">
+            <a:avLst/>
+          </a:prstGeom>
+        </p:spPr>
+      </p:pic>
+    </p:spTree>
+    <p:extLst>
+      <p:ext uri="{BB962C8B-B14F-4D97-AF65-F5344CB8AC3E}">
+        <p14:creationId xmlns:p14="http://schemas.microsoft.com/office/powerpoint/2010/main" val="1767325447"/>
+      </p:ext>
+    </p:extLst>
+  </p:cSld>
+  <p:clrMapOvr>
+    <a:masterClrMapping/>
+  </p:clrMapOvr>
+</p:sld>
+</file>
+
+<file path=ppt/slides/slide54.xml><?xml version="1.0" encoding="utf-8"?>
+<p:sld xmlns:a="http://schemas.openxmlformats.org/drawingml/2006/main" xmlns:r="http://schemas.openxmlformats.org/officeDocument/2006/relationships" xmlns:p="http://schemas.openxmlformats.org/presentationml/2006/main">
+  <p:cSld>
+    <p:spTree>
+      <p:nvGrpSpPr>
+        <p:cNvPr id="1" name=""/>
+        <p:cNvGrpSpPr/>
+        <p:nvPr/>
+      </p:nvGrpSpPr>
+      <p:grpSpPr>
+        <a:xfrm>
+          <a:off x="0" y="0"/>
+          <a:ext cx="0" cy="0"/>
+          <a:chOff x="0" y="0"/>
+          <a:chExt cx="0" cy="0"/>
+        </a:xfrm>
+      </p:grpSpPr>
+      <p:pic>
+        <p:nvPicPr>
+          <p:cNvPr id="3" name="Picture 2">
+            <a:extLst>
+              <a:ext uri="{FF2B5EF4-FFF2-40B4-BE49-F238E27FC236}">
+                <a16:creationId xmlns:a16="http://schemas.microsoft.com/office/drawing/2014/main" id="{7E8B932F-321A-48CE-8456-FACFB98F3E61}"/>
+              </a:ext>
+            </a:extLst>
+          </p:cNvPr>
+          <p:cNvPicPr>
+            <a:picLocks noChangeAspect="1"/>
+          </p:cNvPicPr>
+          <p:nvPr/>
+        </p:nvPicPr>
+        <p:blipFill>
+          <a:blip r:embed="rId2"/>
+          <a:stretch>
+            <a:fillRect/>
+          </a:stretch>
+        </p:blipFill>
+        <p:spPr>
+          <a:xfrm>
+            <a:off x="0" y="0"/>
+            <a:ext cx="12192000" cy="3190873"/>
+          </a:xfrm>
+          <a:prstGeom prst="rect">
+            <a:avLst/>
+          </a:prstGeom>
+        </p:spPr>
+      </p:pic>
+      <p:pic>
+        <p:nvPicPr>
+          <p:cNvPr id="5" name="Picture 4">
+            <a:extLst>
+              <a:ext uri="{FF2B5EF4-FFF2-40B4-BE49-F238E27FC236}">
+                <a16:creationId xmlns:a16="http://schemas.microsoft.com/office/drawing/2014/main" id="{8BFD113E-B155-4771-A911-79E57609007C}"/>
+              </a:ext>
+            </a:extLst>
+          </p:cNvPr>
+          <p:cNvPicPr>
+            <a:picLocks noChangeAspect="1"/>
+          </p:cNvPicPr>
+          <p:nvPr/>
+        </p:nvPicPr>
+        <p:blipFill>
+          <a:blip r:embed="rId3"/>
+          <a:stretch>
+            <a:fillRect/>
+          </a:stretch>
+        </p:blipFill>
+        <p:spPr>
+          <a:xfrm>
+            <a:off x="0" y="3190874"/>
+            <a:ext cx="12192000" cy="3667125"/>
+          </a:xfrm>
+          <a:prstGeom prst="rect">
+            <a:avLst/>
+          </a:prstGeom>
+        </p:spPr>
+      </p:pic>
+    </p:spTree>
+    <p:extLst>
+      <p:ext uri="{BB962C8B-B14F-4D97-AF65-F5344CB8AC3E}">
+        <p14:creationId xmlns:p14="http://schemas.microsoft.com/office/powerpoint/2010/main" val="713186778"/>
+      </p:ext>
+    </p:extLst>
+  </p:cSld>
+  <p:clrMapOvr>
+    <a:masterClrMapping/>
+  </p:clrMapOvr>
+</p:sld>
+</file>
+
+<file path=ppt/slides/slide55.xml><?xml version="1.0" encoding="utf-8"?>
+<p:sld xmlns:a="http://schemas.openxmlformats.org/drawingml/2006/main" xmlns:r="http://schemas.openxmlformats.org/officeDocument/2006/relationships" xmlns:p="http://schemas.openxmlformats.org/presentationml/2006/main">
+  <p:cSld>
+    <p:spTree>
+      <p:nvGrpSpPr>
+        <p:cNvPr id="1" name=""/>
+        <p:cNvGrpSpPr/>
+        <p:nvPr/>
+      </p:nvGrpSpPr>
+      <p:grpSpPr>
+        <a:xfrm>
+          <a:off x="0" y="0"/>
+          <a:ext cx="0" cy="0"/>
+          <a:chOff x="0" y="0"/>
+          <a:chExt cx="0" cy="0"/>
+        </a:xfrm>
+      </p:grpSpPr>
+      <p:pic>
+        <p:nvPicPr>
+          <p:cNvPr id="3" name="Picture 2">
+            <a:extLst>
+              <a:ext uri="{FF2B5EF4-FFF2-40B4-BE49-F238E27FC236}">
+                <a16:creationId xmlns:a16="http://schemas.microsoft.com/office/drawing/2014/main" id="{3D08D635-1FFF-420B-857E-EA05299AC8B2}"/>
+              </a:ext>
+            </a:extLst>
+          </p:cNvPr>
+          <p:cNvPicPr>
+            <a:picLocks noChangeAspect="1"/>
+          </p:cNvPicPr>
+          <p:nvPr/>
+        </p:nvPicPr>
+        <p:blipFill>
+          <a:blip r:embed="rId2"/>
+          <a:stretch>
+            <a:fillRect/>
+          </a:stretch>
+        </p:blipFill>
+        <p:spPr>
+          <a:xfrm>
+            <a:off x="0" y="1"/>
+            <a:ext cx="12147259" cy="3129094"/>
+          </a:xfrm>
+          <a:prstGeom prst="rect">
+            <a:avLst/>
+          </a:prstGeom>
+        </p:spPr>
+      </p:pic>
+      <p:pic>
+        <p:nvPicPr>
+          <p:cNvPr id="5" name="Picture 4">
+            <a:extLst>
+              <a:ext uri="{FF2B5EF4-FFF2-40B4-BE49-F238E27FC236}">
+                <a16:creationId xmlns:a16="http://schemas.microsoft.com/office/drawing/2014/main" id="{D84844F2-1929-4380-98D5-E6080C3AA29D}"/>
+              </a:ext>
+            </a:extLst>
+          </p:cNvPr>
+          <p:cNvPicPr>
+            <a:picLocks noChangeAspect="1"/>
+          </p:cNvPicPr>
+          <p:nvPr/>
+        </p:nvPicPr>
+        <p:blipFill>
+          <a:blip r:embed="rId3"/>
+          <a:stretch>
+            <a:fillRect/>
+          </a:stretch>
+        </p:blipFill>
+        <p:spPr>
+          <a:xfrm>
+            <a:off x="0" y="3129095"/>
+            <a:ext cx="12192000" cy="3728904"/>
+          </a:xfrm>
+          <a:prstGeom prst="rect">
+            <a:avLst/>
+          </a:prstGeom>
+        </p:spPr>
+      </p:pic>
+    </p:spTree>
+    <p:extLst>
+      <p:ext uri="{BB962C8B-B14F-4D97-AF65-F5344CB8AC3E}">
+        <p14:creationId xmlns:p14="http://schemas.microsoft.com/office/powerpoint/2010/main" val="3893057329"/>
+      </p:ext>
+    </p:extLst>
+  </p:cSld>
+  <p:clrMapOvr>
+    <a:masterClrMapping/>
+  </p:clrMapOvr>
+</p:sld>
+</file>
+
+<file path=ppt/slides/slide56.xml><?xml version="1.0" encoding="utf-8"?>
+<p:sld xmlns:a="http://schemas.openxmlformats.org/drawingml/2006/main" xmlns:r="http://schemas.openxmlformats.org/officeDocument/2006/relationships" xmlns:p="http://schemas.openxmlformats.org/presentationml/2006/main">
+  <p:cSld>
+    <p:spTree>
+      <p:nvGrpSpPr>
+        <p:cNvPr id="1" name=""/>
+        <p:cNvGrpSpPr/>
+        <p:nvPr/>
+      </p:nvGrpSpPr>
+      <p:grpSpPr>
+        <a:xfrm>
+          <a:off x="0" y="0"/>
+          <a:ext cx="0" cy="0"/>
+          <a:chOff x="0" y="0"/>
+          <a:chExt cx="0" cy="0"/>
+        </a:xfrm>
+      </p:grpSpPr>
+      <p:sp>
+        <p:nvSpPr>
+          <p:cNvPr id="2" name="TextBox 1">
+            <a:extLst>
+              <a:ext uri="{FF2B5EF4-FFF2-40B4-BE49-F238E27FC236}">
+                <a16:creationId xmlns:a16="http://schemas.microsoft.com/office/drawing/2014/main" id="{FE84B5A1-5F02-4E0A-8ADB-D2DDBDAF442B}"/>
+              </a:ext>
+            </a:extLst>
+          </p:cNvPr>
+          <p:cNvSpPr txBox="1"/>
+          <p:nvPr/>
+        </p:nvSpPr>
+        <p:spPr>
+          <a:xfrm>
+            <a:off x="729843" y="380067"/>
+            <a:ext cx="2944536" cy="400110"/>
+          </a:xfrm>
+          <a:prstGeom prst="rect">
+            <a:avLst/>
+          </a:prstGeom>
+          <a:noFill/>
+        </p:spPr>
+        <p:txBody>
+          <a:bodyPr wrap="square" rtlCol="0">
+            <a:spAutoFit/>
+          </a:bodyPr>
+          <a:lstStyle/>
+          <a:p>
+            <a:r>
+              <a:rPr lang="en-US" sz="2000" b="1" dirty="0"/>
+              <a:t>Output Calculation:</a:t>
+            </a:r>
+          </a:p>
+        </p:txBody>
+      </p:sp>
+      <p:sp>
+        <p:nvSpPr>
+          <p:cNvPr id="3" name="TextBox 2">
+            <a:extLst>
+              <a:ext uri="{FF2B5EF4-FFF2-40B4-BE49-F238E27FC236}">
+                <a16:creationId xmlns:a16="http://schemas.microsoft.com/office/drawing/2014/main" id="{99193244-E5D2-4DF1-B0A8-FADAD92731F1}"/>
+              </a:ext>
+            </a:extLst>
+          </p:cNvPr>
+          <p:cNvSpPr txBox="1"/>
+          <p:nvPr/>
+        </p:nvSpPr>
+        <p:spPr>
+          <a:xfrm>
+            <a:off x="822121" y="1006679"/>
+            <a:ext cx="8363824" cy="3784049"/>
+          </a:xfrm>
+          <a:prstGeom prst="rect">
+            <a:avLst/>
+          </a:prstGeom>
+          <a:noFill/>
+        </p:spPr>
+        <p:txBody>
+          <a:bodyPr wrap="square" rtlCol="0">
+            <a:spAutoFit/>
+          </a:bodyPr>
+          <a:lstStyle/>
+          <a:p>
+            <a:pPr marL="285750" indent="-285750">
+              <a:lnSpc>
+                <a:spcPct val="150000"/>
+              </a:lnSpc>
+              <a:buFont typeface="Arial" panose="020B0604020202020204" pitchFamily="34" charset="0"/>
+              <a:buChar char="•"/>
+            </a:pPr>
+            <a:r>
+              <a:rPr lang="en-US" dirty="0"/>
+              <a:t>Give input to the model then you will get output.</a:t>
+            </a:r>
+          </a:p>
+          <a:p>
+            <a:pPr marL="285750" indent="-285750">
+              <a:lnSpc>
+                <a:spcPct val="150000"/>
+              </a:lnSpc>
+              <a:buFont typeface="Arial" panose="020B0604020202020204" pitchFamily="34" charset="0"/>
+              <a:buChar char="•"/>
+            </a:pPr>
+            <a:r>
+              <a:rPr lang="en-US" dirty="0"/>
+              <a:t>Get index of highest value in the output.</a:t>
+            </a:r>
+          </a:p>
+          <a:p>
+            <a:pPr>
+              <a:lnSpc>
+                <a:spcPct val="150000"/>
+              </a:lnSpc>
+            </a:pPr>
+            <a:endParaRPr lang="en-US" dirty="0"/>
+          </a:p>
+          <a:p>
+            <a:pPr marL="285750" indent="-285750">
+              <a:lnSpc>
+                <a:spcPct val="150000"/>
+              </a:lnSpc>
+              <a:buFont typeface="Arial" panose="020B0604020202020204" pitchFamily="34" charset="0"/>
+              <a:buChar char="•"/>
+            </a:pPr>
+            <a:endParaRPr lang="en-US" dirty="0"/>
+          </a:p>
+          <a:p>
+            <a:pPr marL="285750" indent="-285750">
+              <a:lnSpc>
+                <a:spcPct val="150000"/>
+              </a:lnSpc>
+              <a:buFont typeface="Arial" panose="020B0604020202020204" pitchFamily="34" charset="0"/>
+              <a:buChar char="•"/>
+            </a:pPr>
+            <a:r>
+              <a:rPr lang="en-US" dirty="0"/>
+              <a:t>In above case, its index 0. And index 0 is a predicted value. </a:t>
+            </a:r>
+          </a:p>
+          <a:p>
+            <a:pPr marL="285750" indent="-285750">
+              <a:lnSpc>
+                <a:spcPct val="150000"/>
+              </a:lnSpc>
+              <a:buFont typeface="Arial" panose="020B0604020202020204" pitchFamily="34" charset="0"/>
+              <a:buChar char="•"/>
+            </a:pPr>
+            <a:r>
+              <a:rPr lang="en-US" dirty="0"/>
+              <a:t>Then count how many predicted values are same as actual values. That calculated value will be correct number of values.</a:t>
+            </a:r>
+          </a:p>
+          <a:p>
+            <a:pPr marL="285750" indent="-285750">
+              <a:lnSpc>
+                <a:spcPct val="150000"/>
+              </a:lnSpc>
+              <a:buFont typeface="Arial" panose="020B0604020202020204" pitchFamily="34" charset="0"/>
+              <a:buChar char="•"/>
+            </a:pPr>
+            <a:r>
+              <a:rPr lang="en-US" dirty="0"/>
+              <a:t>Then we calculate accuracy = correct number of values i.e. actual value = predicted values / length of predictions </a:t>
+            </a:r>
+          </a:p>
+        </p:txBody>
+      </p:sp>
+      <p:pic>
+        <p:nvPicPr>
+          <p:cNvPr id="5" name="Picture 4">
+            <a:extLst>
+              <a:ext uri="{FF2B5EF4-FFF2-40B4-BE49-F238E27FC236}">
+                <a16:creationId xmlns:a16="http://schemas.microsoft.com/office/drawing/2014/main" id="{7EA5339F-8096-4D54-B2B3-8AC78FFDB54D}"/>
+              </a:ext>
+            </a:extLst>
+          </p:cNvPr>
+          <p:cNvPicPr>
+            <a:picLocks noChangeAspect="1"/>
+          </p:cNvPicPr>
+          <p:nvPr/>
+        </p:nvPicPr>
+        <p:blipFill>
+          <a:blip r:embed="rId2"/>
+          <a:stretch>
+            <a:fillRect/>
+          </a:stretch>
+        </p:blipFill>
+        <p:spPr>
+          <a:xfrm>
+            <a:off x="1162443" y="1998861"/>
+            <a:ext cx="6696075" cy="714375"/>
+          </a:xfrm>
+          <a:prstGeom prst="rect">
+            <a:avLst/>
+          </a:prstGeom>
+        </p:spPr>
+      </p:pic>
+    </p:spTree>
+    <p:extLst>
+      <p:ext uri="{BB962C8B-B14F-4D97-AF65-F5344CB8AC3E}">
+        <p14:creationId xmlns:p14="http://schemas.microsoft.com/office/powerpoint/2010/main" val="3528017019"/>
+      </p:ext>
+    </p:extLst>
+  </p:cSld>
+  <p:clrMapOvr>
+    <a:masterClrMapping/>
+  </p:clrMapOvr>
+</p:sld>
+</file>
+
 <file path=ppt/slides/slide6.xml><?xml version="1.0" encoding="utf-8"?>
 <p:sld xmlns:a="http://schemas.openxmlformats.org/drawingml/2006/main" xmlns:r="http://schemas.openxmlformats.org/officeDocument/2006/relationships" xmlns:p="http://schemas.openxmlformats.org/presentationml/2006/main">
   <p:cSld>

</xml_diff>